<commit_message>
Updated thesis overiview editable
</commit_message>
<xml_diff>
--- a/Editables/Thesis overview.pptx
+++ b/Editables/Thesis overview.pptx
@@ -108,6 +108,11 @@
       </a:defRPr>
     </a:lvl9pPr>
   </p:defaultTextStyle>
+  <p:extLst>
+    <p:ext uri="{EFAFB233-063F-42B5-8137-9DF3F51BA10A}">
+      <p15:sldGuideLst xmlns:p15="http://schemas.microsoft.com/office/powerpoint/2012/main"/>
+    </p:ext>
+  </p:extLst>
 </p:presentation>
 </file>
 
@@ -4885,7 +4890,7 @@
           </a:ln>
         </p:spPr>
         <p:txBody>
-          <a:bodyPr vert="horz" lIns="3600" rIns="3600" anchor="ctr" anchorCtr="1"/>
+          <a:bodyPr vert="horz" lIns="3600" rIns="3600" anchor="t" anchorCtr="1"/>
           <a:lstStyle>
             <a:lvl1pPr marL="0" indent="0" algn="ctr" defTabSz="457200" rtl="0" eaLnBrk="1" latinLnBrk="0" hangingPunct="1">
               <a:spcBef>
@@ -5037,7 +5042,7 @@
                 <a:ea typeface="DejaVu Sans"/>
                 <a:cs typeface="Calibri" panose="020F0502020204030204" pitchFamily="34" charset="0"/>
               </a:rPr>
-              <a:t>                 Work Structures</a:t>
+              <a:t>                   Work Structure</a:t>
             </a:r>
           </a:p>
         </p:txBody>
@@ -5409,7 +5414,7 @@
                 <a:ea typeface="DejaVu Sans"/>
                 <a:cs typeface="Calibri" panose="020F0502020204030204" pitchFamily="34" charset="0"/>
               </a:rPr>
-              <a:t>                                  Community Ideologies</a:t>
+              <a:t>                                     Community Ideology</a:t>
             </a:r>
           </a:p>
         </p:txBody>

</xml_diff>